<commit_message>
updated .com.sg + URL for GoBusiness
</commit_message>
<xml_diff>
--- a/images/Helplines_20191031.pptx
+++ b/images/Helplines_20191031.pptx
@@ -4721,8 +4721,8 @@
         </p:nvSpPr>
         <p:spPr>
           <a:xfrm>
-            <a:off x="4273912" y="478302"/>
-            <a:ext cx="3636819" cy="6139457"/>
+            <a:off x="4178216" y="478302"/>
+            <a:ext cx="3732516" cy="6139457"/>
           </a:xfrm>
           <a:prstGeom prst="rect">
             <a:avLst/>
@@ -4825,8 +4825,8 @@
         </p:nvSpPr>
         <p:spPr>
           <a:xfrm>
-            <a:off x="4392043" y="670229"/>
-            <a:ext cx="3359255" cy="2585323"/>
+            <a:off x="4273911" y="670229"/>
+            <a:ext cx="3543645" cy="2585323"/>
           </a:xfrm>
           <a:prstGeom prst="rect">
             <a:avLst/>
@@ -4860,7 +4860,6 @@
               <a:rPr lang="en-US" sz="2000" b="1" dirty="0" smtClean="0"/>
               <a:t> Licensing</a:t>
             </a:r>
-            <a:endParaRPr lang="en-US" sz="2000" b="1" dirty="0" smtClean="0"/>
           </a:p>
           <a:p>
             <a:endParaRPr lang="en-US" sz="1600" dirty="0" smtClean="0"/>
@@ -4916,7 +4915,7 @@
               <a:rPr lang="en-US" sz="1600" dirty="0" smtClean="0">
                 <a:hlinkClick r:id="rId4"/>
               </a:rPr>
-              <a:t>licences-helpdesk@crimsonlogic.com</a:t>
+              <a:t>licences-helpdesk@crimsonlogic.com.sg</a:t>
             </a:r>
             <a:endParaRPr lang="en-US" sz="1600" dirty="0" smtClean="0"/>
           </a:p>
@@ -4935,7 +4934,13 @@
               <a:rPr lang="en-US" sz="1600" dirty="0" smtClean="0">
                 <a:hlinkClick r:id="rId5"/>
               </a:rPr>
-              <a:t>https://licence1.business.gov.sg</a:t>
+              <a:t>https</a:t>
+            </a:r>
+            <a:r>
+              <a:rPr lang="en-US" sz="1600" dirty="0" smtClean="0">
+                <a:hlinkClick r:id="rId5"/>
+              </a:rPr>
+              <a:t>://www.gobusiness.gov.sg/licences</a:t>
             </a:r>
             <a:endParaRPr lang="en-US" sz="1600" dirty="0" smtClean="0"/>
           </a:p>
@@ -4980,11 +4985,7 @@
             </a:r>
             <a:r>
               <a:rPr lang="en-US" sz="1600" dirty="0" smtClean="0"/>
-              <a:t> </a:t>
-            </a:r>
-            <a:r>
-              <a:rPr lang="en-US" sz="1600" dirty="0" smtClean="0"/>
-              <a:t>matters, e.g.:</a:t>
+              <a:t> matters, e.g.:</a:t>
             </a:r>
           </a:p>
           <a:p>
@@ -4998,11 +4999,7 @@
             </a:r>
             <a:r>
               <a:rPr lang="en-US" sz="1600" i="1" dirty="0" smtClean="0"/>
-              <a:t> Licensing </a:t>
-            </a:r>
-            <a:r>
-              <a:rPr lang="en-US" sz="1600" i="1" dirty="0" smtClean="0"/>
-              <a:t>Login ID</a:t>
+              <a:t> Licensing Login ID</a:t>
             </a:r>
           </a:p>
           <a:p>
@@ -5020,11 +5017,7 @@
             </a:r>
             <a:r>
               <a:rPr lang="en-US" sz="1600" i="1" dirty="0" smtClean="0"/>
-              <a:t> Licensing </a:t>
-            </a:r>
-            <a:r>
-              <a:rPr lang="en-US" sz="1600" i="1" dirty="0" smtClean="0"/>
-              <a:t>password</a:t>
+              <a:t> Licensing password</a:t>
             </a:r>
           </a:p>
           <a:p>
@@ -6182,10 +6175,27 @@
 
 <file path=customXml/item1.xml><?xml version="1.0" encoding="utf-8"?>
 <?mso-contentType ?>
-<SharedContentType xmlns="Microsoft.SharePoint.Taxonomy.ContentTypeSync" SourceId="8102fb6d-ee62-459b-bf66-4cc38a152917" ContentTypeId="0x010100ED95446D556EF74A943384CE557254A9" PreviousValue="false"/>
+<FormTemplates xmlns="http://schemas.microsoft.com/sharepoint/v3/contenttype/forms">
+  <Display>DocumentLibraryForm</Display>
+  <Edit>DocumentLibraryForm</Edit>
+  <New>DocumentLibraryForm</New>
+</FormTemplates>
 </file>
 
 <file path=customXml/item2.xml><?xml version="1.0" encoding="utf-8"?>
+<p:properties xmlns:p="http://schemas.microsoft.com/office/2006/metadata/properties" xmlns:xsi="http://www.w3.org/2001/XMLSchema-instance" xmlns:pc="http://schemas.microsoft.com/office/infopath/2007/PartnerControls">
+  <documentManagement>
+    <MinlawDescription xmlns="a85b171a-1052-409b-8da0-7018bcbcf029" xsi:nil="true"/>
+    <TaxKeywordTaxHTField xmlns="a85b171a-1052-409b-8da0-7018bcbcf029">
+      <Terms xmlns="http://schemas.microsoft.com/office/infopath/2007/PartnerControls"/>
+    </TaxKeywordTaxHTField>
+    <TaxCatchAll xmlns="a85b171a-1052-409b-8da0-7018bcbcf029"/>
+    <RelatedItems xmlns="http://schemas.microsoft.com/sharepoint/v3" xsi:nil="true"/>
+  </documentManagement>
+</p:properties>
+</file>
+
+<file path=customXml/item3.xml><?xml version="1.0" encoding="utf-8"?>
 <ct:contentTypeSchema xmlns:ct="http://schemas.microsoft.com/office/2006/metadata/contentType" xmlns:ma="http://schemas.microsoft.com/office/2006/metadata/properties/metaAttributes" ct:_="" ma:_="" ma:contentTypeName="MinLaw Document" ma:contentTypeID="0x010100ED95446D556EF74A943384CE557254A900BBA171D2A1CB9E4987BC34BA344F002C" ma:contentTypeVersion="3" ma:contentTypeDescription="Create a new document." ma:contentTypeScope="" ma:versionID="a4e29336844b7e997b80ac5d4c52e4a4">
   <xsd:schema xmlns:xsd="http://www.w3.org/2001/XMLSchema" xmlns:xs="http://www.w3.org/2001/XMLSchema" xmlns:p="http://schemas.microsoft.com/office/2006/metadata/properties" xmlns:ns1="http://schemas.microsoft.com/sharepoint/v3" xmlns:ns2="a85b171a-1052-409b-8da0-7018bcbcf029" targetNamespace="http://schemas.microsoft.com/office/2006/metadata/properties" ma:root="true" ma:fieldsID="c42aad7470ad929989d0b5f94ef14958" ns1:_="" ns2:_="">
     <xsd:import namespace="http://schemas.microsoft.com/sharepoint/v3"/>
@@ -6356,37 +6366,37 @@
 </ct:contentTypeSchema>
 </file>
 
-<file path=customXml/item3.xml><?xml version="1.0" encoding="utf-8"?>
-<p:properties xmlns:p="http://schemas.microsoft.com/office/2006/metadata/properties" xmlns:xsi="http://www.w3.org/2001/XMLSchema-instance" xmlns:pc="http://schemas.microsoft.com/office/infopath/2007/PartnerControls">
-  <documentManagement>
-    <MinlawDescription xmlns="a85b171a-1052-409b-8da0-7018bcbcf029" xsi:nil="true"/>
-    <TaxKeywordTaxHTField xmlns="a85b171a-1052-409b-8da0-7018bcbcf029">
-      <Terms xmlns="http://schemas.microsoft.com/office/infopath/2007/PartnerControls"/>
-    </TaxKeywordTaxHTField>
-    <TaxCatchAll xmlns="a85b171a-1052-409b-8da0-7018bcbcf029"/>
-    <RelatedItems xmlns="http://schemas.microsoft.com/sharepoint/v3" xsi:nil="true"/>
-  </documentManagement>
-</p:properties>
-</file>
-
 <file path=customXml/item4.xml><?xml version="1.0" encoding="utf-8"?>
 <?mso-contentType ?>
-<FormTemplates xmlns="http://schemas.microsoft.com/sharepoint/v3/contenttype/forms">
-  <Display>DocumentLibraryForm</Display>
-  <Edit>DocumentLibraryForm</Edit>
-  <New>DocumentLibraryForm</New>
-</FormTemplates>
+<SharedContentType xmlns="Microsoft.SharePoint.Taxonomy.ContentTypeSync" SourceId="8102fb6d-ee62-459b-bf66-4cc38a152917" ContentTypeId="0x010100ED95446D556EF74A943384CE557254A9" PreviousValue="false"/>
 </file>
 
 <file path=customXml/itemProps1.xml><?xml version="1.0" encoding="utf-8"?>
-<ds:datastoreItem xmlns:ds="http://schemas.openxmlformats.org/officeDocument/2006/customXml" ds:itemID="{B65C6DCA-05CB-4C13-9271-0E8D3067A2AE}">
+<ds:datastoreItem xmlns:ds="http://schemas.openxmlformats.org/officeDocument/2006/customXml" ds:itemID="{A4C71C97-87EA-45C4-ACA9-196D5F2E1CC3}">
   <ds:schemaRefs>
-    <ds:schemaRef ds:uri="Microsoft.SharePoint.Taxonomy.ContentTypeSync"/>
+    <ds:schemaRef ds:uri="http://schemas.microsoft.com/sharepoint/v3/contenttype/forms"/>
   </ds:schemaRefs>
 </ds:datastoreItem>
 </file>
 
 <file path=customXml/itemProps2.xml><?xml version="1.0" encoding="utf-8"?>
+<ds:datastoreItem xmlns:ds="http://schemas.openxmlformats.org/officeDocument/2006/customXml" ds:itemID="{12BA4CF2-AAF4-4A80-98CE-0A2C62B7FD64}">
+  <ds:schemaRefs>
+    <ds:schemaRef ds:uri="http://schemas.microsoft.com/office/infopath/2007/PartnerControls"/>
+    <ds:schemaRef ds:uri="http://schemas.microsoft.com/office/2006/documentManagement/types"/>
+    <ds:schemaRef ds:uri="http://schemas.openxmlformats.org/package/2006/metadata/core-properties"/>
+    <ds:schemaRef ds:uri="a85b171a-1052-409b-8da0-7018bcbcf029"/>
+    <ds:schemaRef ds:uri="http://purl.org/dc/terms/"/>
+    <ds:schemaRef ds:uri="http://www.w3.org/XML/1998/namespace"/>
+    <ds:schemaRef ds:uri="http://schemas.microsoft.com/sharepoint/v3"/>
+    <ds:schemaRef ds:uri="http://schemas.microsoft.com/office/2006/metadata/properties"/>
+    <ds:schemaRef ds:uri="http://purl.org/dc/dcmitype/"/>
+    <ds:schemaRef ds:uri="http://purl.org/dc/elements/1.1/"/>
+  </ds:schemaRefs>
+</ds:datastoreItem>
+</file>
+
+<file path=customXml/itemProps3.xml><?xml version="1.0" encoding="utf-8"?>
 <ds:datastoreItem xmlns:ds="http://schemas.openxmlformats.org/officeDocument/2006/customXml" ds:itemID="{6D0A020A-B17B-4F64-A2A6-0F935B584F82}">
   <ds:schemaRefs>
     <ds:schemaRef ds:uri="http://schemas.microsoft.com/office/2006/metadata/contentType"/>
@@ -6405,27 +6415,10 @@
 </ds:datastoreItem>
 </file>
 
-<file path=customXml/itemProps3.xml><?xml version="1.0" encoding="utf-8"?>
-<ds:datastoreItem xmlns:ds="http://schemas.openxmlformats.org/officeDocument/2006/customXml" ds:itemID="{12BA4CF2-AAF4-4A80-98CE-0A2C62B7FD64}">
+<file path=customXml/itemProps4.xml><?xml version="1.0" encoding="utf-8"?>
+<ds:datastoreItem xmlns:ds="http://schemas.openxmlformats.org/officeDocument/2006/customXml" ds:itemID="{B65C6DCA-05CB-4C13-9271-0E8D3067A2AE}">
   <ds:schemaRefs>
-    <ds:schemaRef ds:uri="http://schemas.microsoft.com/office/infopath/2007/PartnerControls"/>
-    <ds:schemaRef ds:uri="http://schemas.microsoft.com/office/2006/documentManagement/types"/>
-    <ds:schemaRef ds:uri="http://schemas.openxmlformats.org/package/2006/metadata/core-properties"/>
-    <ds:schemaRef ds:uri="a85b171a-1052-409b-8da0-7018bcbcf029"/>
-    <ds:schemaRef ds:uri="http://purl.org/dc/terms/"/>
-    <ds:schemaRef ds:uri="http://www.w3.org/XML/1998/namespace"/>
-    <ds:schemaRef ds:uri="http://schemas.microsoft.com/sharepoint/v3"/>
-    <ds:schemaRef ds:uri="http://schemas.microsoft.com/office/2006/metadata/properties"/>
-    <ds:schemaRef ds:uri="http://purl.org/dc/dcmitype/"/>
-    <ds:schemaRef ds:uri="http://purl.org/dc/elements/1.1/"/>
-  </ds:schemaRefs>
-</ds:datastoreItem>
-</file>
-
-<file path=customXml/itemProps4.xml><?xml version="1.0" encoding="utf-8"?>
-<ds:datastoreItem xmlns:ds="http://schemas.openxmlformats.org/officeDocument/2006/customXml" ds:itemID="{A4C71C97-87EA-45C4-ACA9-196D5F2E1CC3}">
-  <ds:schemaRefs>
-    <ds:schemaRef ds:uri="http://schemas.microsoft.com/sharepoint/v3/contenttype/forms"/>
+    <ds:schemaRef ds:uri="Microsoft.SharePoint.Taxonomy.ContentTypeSync"/>
   </ds:schemaRefs>
 </ds:datastoreItem>
 </file>
</xml_diff>